<commit_message>
updated personnel slide position
</commit_message>
<xml_diff>
--- a/Team11_Sprint1_Presentation.pptx
+++ b/Team11_Sprint1_Presentation.pptx
@@ -6,8 +6,8 @@
   </p:sldMasterIdLst>
   <p:sldIdLst>
     <p:sldId id="256" r:id="rId2"/>
-    <p:sldId id="258" r:id="rId3"/>
-    <p:sldId id="257" r:id="rId4"/>
+    <p:sldId id="257" r:id="rId3"/>
+    <p:sldId id="258" r:id="rId4"/>
     <p:sldId id="259" r:id="rId5"/>
     <p:sldId id="260" r:id="rId6"/>
     <p:sldId id="261" r:id="rId7"/>
@@ -335,7 +335,7 @@
             <a:fld id="{53074F12-AA26-4AC8-9962-C36BB8F32554}" type="datetimeFigureOut">
               <a:rPr lang="en-US" smtClean="0"/>
               <a:pPr/>
-              <a:t>1/30/2017</a:t>
+              <a:t>2/1/2017</a:t>
             </a:fld>
             <a:endParaRPr lang="en-US"/>
           </a:p>
@@ -590,7 +590,7 @@
             <a:fld id="{53074F12-AA26-4AC8-9962-C36BB8F32554}" type="datetimeFigureOut">
               <a:rPr lang="en-US" smtClean="0"/>
               <a:pPr/>
-              <a:t>1/30/2017</a:t>
+              <a:t>2/1/2017</a:t>
             </a:fld>
             <a:endParaRPr lang="en-US"/>
           </a:p>
@@ -762,7 +762,7 @@
             <a:fld id="{53074F12-AA26-4AC8-9962-C36BB8F32554}" type="datetimeFigureOut">
               <a:rPr lang="en-US" smtClean="0"/>
               <a:pPr/>
-              <a:t>1/30/2017</a:t>
+              <a:t>2/1/2017</a:t>
             </a:fld>
             <a:endParaRPr lang="en-US"/>
           </a:p>
@@ -944,7 +944,7 @@
             <a:fld id="{53074F12-AA26-4AC8-9962-C36BB8F32554}" type="datetimeFigureOut">
               <a:rPr lang="en-US" smtClean="0"/>
               <a:pPr/>
-              <a:t>1/30/2017</a:t>
+              <a:t>2/1/2017</a:t>
             </a:fld>
             <a:endParaRPr lang="en-US"/>
           </a:p>
@@ -1167,7 +1167,7 @@
             <a:fld id="{53074F12-AA26-4AC8-9962-C36BB8F32554}" type="datetimeFigureOut">
               <a:rPr lang="en-US" smtClean="0"/>
               <a:pPr/>
-              <a:t>1/30/2017</a:t>
+              <a:t>2/1/2017</a:t>
             </a:fld>
             <a:endParaRPr lang="en-US"/>
           </a:p>
@@ -1395,7 +1395,7 @@
             <a:fld id="{53074F12-AA26-4AC8-9962-C36BB8F32554}" type="datetimeFigureOut">
               <a:rPr lang="en-US" smtClean="0"/>
               <a:pPr/>
-              <a:t>1/30/2017</a:t>
+              <a:t>2/1/2017</a:t>
             </a:fld>
             <a:endParaRPr lang="en-US"/>
           </a:p>
@@ -1643,7 +1643,7 @@
             <a:fld id="{53074F12-AA26-4AC8-9962-C36BB8F32554}" type="datetimeFigureOut">
               <a:rPr lang="en-US" smtClean="0"/>
               <a:pPr/>
-              <a:t>1/30/2017</a:t>
+              <a:t>2/1/2017</a:t>
             </a:fld>
             <a:endParaRPr lang="en-US"/>
           </a:p>
@@ -1933,7 +1933,7 @@
             <a:fld id="{53074F12-AA26-4AC8-9962-C36BB8F32554}" type="datetimeFigureOut">
               <a:rPr lang="en-US" smtClean="0"/>
               <a:pPr/>
-              <a:t>1/30/2017</a:t>
+              <a:t>2/1/2017</a:t>
             </a:fld>
             <a:endParaRPr lang="en-US"/>
           </a:p>
@@ -2416,7 +2416,7 @@
             <a:fld id="{53074F12-AA26-4AC8-9962-C36BB8F32554}" type="datetimeFigureOut">
               <a:rPr lang="en-US" smtClean="0"/>
               <a:pPr/>
-              <a:t>1/30/2017</a:t>
+              <a:t>2/1/2017</a:t>
             </a:fld>
             <a:endParaRPr lang="en-US"/>
           </a:p>
@@ -2536,7 +2536,7 @@
             <a:fld id="{53074F12-AA26-4AC8-9962-C36BB8F32554}" type="datetimeFigureOut">
               <a:rPr lang="en-US" smtClean="0"/>
               <a:pPr/>
-              <a:t>1/30/2017</a:t>
+              <a:t>2/1/2017</a:t>
             </a:fld>
             <a:endParaRPr lang="en-US"/>
           </a:p>
@@ -2633,7 +2633,7 @@
             <a:fld id="{53074F12-AA26-4AC8-9962-C36BB8F32554}" type="datetimeFigureOut">
               <a:rPr lang="en-US" smtClean="0"/>
               <a:pPr/>
-              <a:t>1/30/2017</a:t>
+              <a:t>2/1/2017</a:t>
             </a:fld>
             <a:endParaRPr lang="en-US"/>
           </a:p>
@@ -2912,7 +2912,7 @@
             <a:fld id="{53074F12-AA26-4AC8-9962-C36BB8F32554}" type="datetimeFigureOut">
               <a:rPr lang="en-US" smtClean="0"/>
               <a:pPr/>
-              <a:t>1/30/2017</a:t>
+              <a:t>2/1/2017</a:t>
             </a:fld>
             <a:endParaRPr lang="en-US"/>
           </a:p>
@@ -3136,7 +3136,7 @@
             <a:fld id="{53074F12-AA26-4AC8-9962-C36BB8F32554}" type="datetimeFigureOut">
               <a:rPr lang="en-US" smtClean="0"/>
               <a:pPr/>
-              <a:t>1/30/2017</a:t>
+              <a:t>2/1/2017</a:t>
             </a:fld>
             <a:endParaRPr lang="en-US"/>
           </a:p>
@@ -3632,9 +3632,10 @@
           </a:bodyPr>
           <a:lstStyle/>
           <a:p>
-            <a:r>
-              <a:rPr lang="en-US" dirty="0" smtClean="0"/>
-              <a:t>Overview</a:t>
+            <a:pPr algn="l"/>
+            <a:r>
+              <a:rPr lang="en-US" dirty="0" smtClean="0"/>
+              <a:t>Personnel</a:t>
             </a:r>
             <a:endParaRPr lang="en-US" dirty="0"/>
           </a:p>
@@ -3657,49 +3658,26 @@
           <a:p>
             <a:r>
               <a:rPr lang="en-US" dirty="0" smtClean="0"/>
-              <a:t>O</a:t>
-            </a:r>
-            <a:r>
-              <a:rPr lang="en-US" dirty="0" smtClean="0"/>
-              <a:t>bjective: develop </a:t>
-            </a:r>
-            <a:r>
-              <a:rPr lang="en-US" dirty="0"/>
-              <a:t>a </a:t>
-            </a:r>
-            <a:r>
-              <a:rPr lang="en-US" dirty="0" smtClean="0"/>
-              <a:t>system which will maintain detailed information for a major trucking company.  </a:t>
-            </a:r>
-          </a:p>
-          <a:p>
-            <a:r>
-              <a:rPr lang="en-US" dirty="0" smtClean="0"/>
-              <a:t>Records, </a:t>
-            </a:r>
-            <a:r>
-              <a:rPr lang="en-US" dirty="0"/>
-              <a:t>current and historical, must </a:t>
-            </a:r>
-            <a:r>
-              <a:rPr lang="en-US" dirty="0" smtClean="0"/>
-              <a:t>be maintained for a ten-year period.  </a:t>
-            </a:r>
-          </a:p>
-          <a:p>
-            <a:r>
-              <a:rPr lang="en-US" dirty="0" smtClean="0"/>
-              <a:t>To </a:t>
-            </a:r>
-            <a:r>
-              <a:rPr lang="en-US" dirty="0"/>
-              <a:t>protect the privacy and security of </a:t>
-            </a:r>
-            <a:r>
-              <a:rPr lang="en-US" dirty="0" smtClean="0"/>
-              <a:t>company, user access will be limited to “need to know”.</a:t>
-            </a:r>
-            <a:endParaRPr lang="en-US" dirty="0"/>
+              <a:t>Donal Cavanaugh</a:t>
+            </a:r>
+          </a:p>
+          <a:p>
+            <a:r>
+              <a:rPr lang="en-US" dirty="0" smtClean="0"/>
+              <a:t>James Williamson</a:t>
+            </a:r>
+          </a:p>
+          <a:p>
+            <a:r>
+              <a:rPr lang="en-US" dirty="0" smtClean="0"/>
+              <a:t>Zach Johnson</a:t>
+            </a:r>
+          </a:p>
+          <a:p>
+            <a:r>
+              <a:rPr lang="en-US" dirty="0" smtClean="0"/>
+              <a:t>John Mullen</a:t>
+            </a:r>
           </a:p>
           <a:p>
             <a:endParaRPr lang="en-US" dirty="0"/>
@@ -3709,7 +3687,7 @@
     </p:spTree>
     <p:extLst>
       <p:ext uri="{BB962C8B-B14F-4D97-AF65-F5344CB8AC3E}">
-        <p14:creationId xmlns:p14="http://schemas.microsoft.com/office/powerpoint/2010/main" val="2371762642"/>
+        <p14:creationId xmlns:p14="http://schemas.microsoft.com/office/powerpoint/2010/main" val="4103309497"/>
       </p:ext>
     </p:extLst>
   </p:cSld>
@@ -3760,10 +3738,9 @@
           </a:bodyPr>
           <a:lstStyle/>
           <a:p>
-            <a:pPr algn="l"/>
-            <a:r>
-              <a:rPr lang="en-US" dirty="0" smtClean="0"/>
-              <a:t>Personnel</a:t>
+            <a:r>
+              <a:rPr lang="en-US" dirty="0" smtClean="0"/>
+              <a:t>Overview</a:t>
             </a:r>
             <a:endParaRPr lang="en-US" dirty="0"/>
           </a:p>
@@ -3786,26 +3763,45 @@
           <a:p>
             <a:r>
               <a:rPr lang="en-US" dirty="0" smtClean="0"/>
-              <a:t>Donal Cavanaugh</a:t>
-            </a:r>
-          </a:p>
-          <a:p>
-            <a:r>
-              <a:rPr lang="en-US" dirty="0" smtClean="0"/>
-              <a:t>James Williamson</a:t>
-            </a:r>
-          </a:p>
-          <a:p>
-            <a:r>
-              <a:rPr lang="en-US" dirty="0" smtClean="0"/>
-              <a:t>Zach Johnson</a:t>
-            </a:r>
-          </a:p>
-          <a:p>
-            <a:r>
-              <a:rPr lang="en-US" dirty="0" smtClean="0"/>
-              <a:t>John Mullen</a:t>
-            </a:r>
+              <a:t>Objective: develop </a:t>
+            </a:r>
+            <a:r>
+              <a:rPr lang="en-US" dirty="0"/>
+              <a:t>a </a:t>
+            </a:r>
+            <a:r>
+              <a:rPr lang="en-US" dirty="0" smtClean="0"/>
+              <a:t>system which will maintain detailed information for a major trucking company.  </a:t>
+            </a:r>
+          </a:p>
+          <a:p>
+            <a:r>
+              <a:rPr lang="en-US" dirty="0" smtClean="0"/>
+              <a:t>Records, </a:t>
+            </a:r>
+            <a:r>
+              <a:rPr lang="en-US" dirty="0"/>
+              <a:t>current and historical, must </a:t>
+            </a:r>
+            <a:r>
+              <a:rPr lang="en-US" dirty="0" smtClean="0"/>
+              <a:t>be maintained for a ten-year period.  </a:t>
+            </a:r>
+          </a:p>
+          <a:p>
+            <a:r>
+              <a:rPr lang="en-US" dirty="0" smtClean="0"/>
+              <a:t>To </a:t>
+            </a:r>
+            <a:r>
+              <a:rPr lang="en-US" dirty="0"/>
+              <a:t>protect the privacy and security of </a:t>
+            </a:r>
+            <a:r>
+              <a:rPr lang="en-US" dirty="0" smtClean="0"/>
+              <a:t>company, user access will be limited to “need to know”.</a:t>
+            </a:r>
+            <a:endParaRPr lang="en-US" dirty="0"/>
           </a:p>
           <a:p>
             <a:endParaRPr lang="en-US" dirty="0"/>
@@ -3815,7 +3811,7 @@
     </p:spTree>
     <p:extLst>
       <p:ext uri="{BB962C8B-B14F-4D97-AF65-F5344CB8AC3E}">
-        <p14:creationId xmlns:p14="http://schemas.microsoft.com/office/powerpoint/2010/main" val="4103309497"/>
+        <p14:creationId xmlns:p14="http://schemas.microsoft.com/office/powerpoint/2010/main" val="2371762642"/>
       </p:ext>
     </p:extLst>
   </p:cSld>

</xml_diff>